<commit_message>
Remedy a typo across `forms/slides`
</commit_message>
<xml_diff>
--- a/phase-2/forms/slides/forms.pptx
+++ b/phase-2/forms/slides/forms.pptx
@@ -5222,7 +5222,7 @@
       </p:grpSpPr>
       <p:sp>
         <p:nvSpPr>
-          <p:cNvPr id="167" name="What’s your favorite number?"/>
+          <p:cNvPr id="167" name="What’s your favorite movie?"/>
           <p:cNvSpPr txBox="1"/>
           <p:nvPr>
             <p:ph type="body" sz="half" idx="1"/>
@@ -5239,7 +5239,7 @@
           <a:p>
             <a:pPr/>
             <a:r>
-              <a:t>What’s your favorite number?</a:t>
+              <a:t>What’s your favorite movie?</a:t>
             </a:r>
           </a:p>
         </p:txBody>

</xml_diff>

<commit_message>
Clarify how we control `<input>` elements
</commit_message>
<xml_diff>
--- a/phase-2/forms/slides/forms.pptx
+++ b/phase-2/forms/slides/forms.pptx
@@ -5558,7 +5558,7 @@
               </a:defRPr>
             </a:pPr>
             <a:r>
-              <a:t>function handleChange(event) console.log(event.target.value)</a:t>
+              <a:t>function handleChange(event) setName(event.target.value)</a:t>
             </a:r>
           </a:p>
           <a:p>
@@ -6044,7 +6044,7 @@
               <a:t>uncontrolled</a:t>
             </a:r>
             <a:r>
-              <a:t> when its value isn’t held in state.</a:t>
+              <a:t> when its value is managed internally.</a:t>
             </a:r>
           </a:p>
           <a:p>
@@ -6074,7 +6074,7 @@
               <a:t>controlled</a:t>
             </a:r>
             <a:r>
-              <a:t> when its value is held in state.</a:t>
+              <a:t> when its value is managed by its parent.</a:t>
             </a:r>
           </a:p>
           <a:p>

</xml_diff>